<commit_message>
Add UX Case Ravinneliite
</commit_message>
<xml_diff>
--- a/files/UX-Case-Ravinneliite.pptx
+++ b/files/UX-Case-Ravinneliite.pptx
@@ -263,7 +263,7 @@
           <a:p>
             <a:fld id="{1C4898B5-FD14-9A45-80E6-7ABAB258872B}" type="datetimeFigureOut">
               <a:rPr lang="fi-FI" smtClean="0"/>
-              <a:t>29.5.2018</a:t>
+              <a:t>24.6.2018</a:t>
             </a:fld>
             <a:endParaRPr lang="fi-FI"/>
           </a:p>
@@ -463,7 +463,7 @@
           <a:p>
             <a:fld id="{1C4898B5-FD14-9A45-80E6-7ABAB258872B}" type="datetimeFigureOut">
               <a:rPr lang="fi-FI" smtClean="0"/>
-              <a:t>29.5.2018</a:t>
+              <a:t>24.6.2018</a:t>
             </a:fld>
             <a:endParaRPr lang="fi-FI"/>
           </a:p>
@@ -673,7 +673,7 @@
           <a:p>
             <a:fld id="{1C4898B5-FD14-9A45-80E6-7ABAB258872B}" type="datetimeFigureOut">
               <a:rPr lang="fi-FI" smtClean="0"/>
-              <a:t>29.5.2018</a:t>
+              <a:t>24.6.2018</a:t>
             </a:fld>
             <a:endParaRPr lang="fi-FI"/>
           </a:p>
@@ -873,7 +873,7 @@
           <a:p>
             <a:fld id="{1C4898B5-FD14-9A45-80E6-7ABAB258872B}" type="datetimeFigureOut">
               <a:rPr lang="fi-FI" smtClean="0"/>
-              <a:t>29.5.2018</a:t>
+              <a:t>24.6.2018</a:t>
             </a:fld>
             <a:endParaRPr lang="fi-FI"/>
           </a:p>
@@ -1149,7 +1149,7 @@
           <a:p>
             <a:fld id="{1C4898B5-FD14-9A45-80E6-7ABAB258872B}" type="datetimeFigureOut">
               <a:rPr lang="fi-FI" smtClean="0"/>
-              <a:t>29.5.2018</a:t>
+              <a:t>24.6.2018</a:t>
             </a:fld>
             <a:endParaRPr lang="fi-FI"/>
           </a:p>
@@ -1417,7 +1417,7 @@
           <a:p>
             <a:fld id="{1C4898B5-FD14-9A45-80E6-7ABAB258872B}" type="datetimeFigureOut">
               <a:rPr lang="fi-FI" smtClean="0"/>
-              <a:t>29.5.2018</a:t>
+              <a:t>24.6.2018</a:t>
             </a:fld>
             <a:endParaRPr lang="fi-FI"/>
           </a:p>
@@ -1832,7 +1832,7 @@
           <a:p>
             <a:fld id="{1C4898B5-FD14-9A45-80E6-7ABAB258872B}" type="datetimeFigureOut">
               <a:rPr lang="fi-FI" smtClean="0"/>
-              <a:t>29.5.2018</a:t>
+              <a:t>24.6.2018</a:t>
             </a:fld>
             <a:endParaRPr lang="fi-FI"/>
           </a:p>
@@ -1974,7 +1974,7 @@
           <a:p>
             <a:fld id="{1C4898B5-FD14-9A45-80E6-7ABAB258872B}" type="datetimeFigureOut">
               <a:rPr lang="fi-FI" smtClean="0"/>
-              <a:t>29.5.2018</a:t>
+              <a:t>24.6.2018</a:t>
             </a:fld>
             <a:endParaRPr lang="fi-FI"/>
           </a:p>
@@ -2087,7 +2087,7 @@
           <a:p>
             <a:fld id="{1C4898B5-FD14-9A45-80E6-7ABAB258872B}" type="datetimeFigureOut">
               <a:rPr lang="fi-FI" smtClean="0"/>
-              <a:t>29.5.2018</a:t>
+              <a:t>24.6.2018</a:t>
             </a:fld>
             <a:endParaRPr lang="fi-FI"/>
           </a:p>
@@ -2400,7 +2400,7 @@
           <a:p>
             <a:fld id="{1C4898B5-FD14-9A45-80E6-7ABAB258872B}" type="datetimeFigureOut">
               <a:rPr lang="fi-FI" smtClean="0"/>
-              <a:t>29.5.2018</a:t>
+              <a:t>24.6.2018</a:t>
             </a:fld>
             <a:endParaRPr lang="fi-FI"/>
           </a:p>
@@ -2689,7 +2689,7 @@
           <a:p>
             <a:fld id="{1C4898B5-FD14-9A45-80E6-7ABAB258872B}" type="datetimeFigureOut">
               <a:rPr lang="fi-FI" smtClean="0"/>
-              <a:t>29.5.2018</a:t>
+              <a:t>24.6.2018</a:t>
             </a:fld>
             <a:endParaRPr lang="fi-FI"/>
           </a:p>
@@ -2932,7 +2932,7 @@
           <a:p>
             <a:fld id="{1C4898B5-FD14-9A45-80E6-7ABAB258872B}" type="datetimeFigureOut">
               <a:rPr lang="fi-FI" smtClean="0"/>
-              <a:t>29.5.2018</a:t>
+              <a:t>24.6.2018</a:t>
             </a:fld>
             <a:endParaRPr lang="fi-FI"/>
           </a:p>
@@ -3335,6 +3335,21 @@
 <file path=ppt/slides/slide1.xml><?xml version="1.0" encoding="utf-8"?>
 <p:sld xmlns:a="http://schemas.openxmlformats.org/drawingml/2006/main" xmlns:r="http://schemas.openxmlformats.org/officeDocument/2006/relationships" xmlns:p="http://schemas.openxmlformats.org/presentationml/2006/main">
   <p:cSld>
+    <p:bg>
+      <p:bgPr>
+        <a:blipFill dpi="0" rotWithShape="1">
+          <a:blip r:embed="rId2">
+            <a:alphaModFix amt="25000"/>
+            <a:lum/>
+          </a:blip>
+          <a:srcRect/>
+          <a:stretch>
+            <a:fillRect t="-5000" b="-5000"/>
+          </a:stretch>
+        </a:blipFill>
+        <a:effectLst/>
+      </p:bgPr>
+    </p:bg>
     <p:spTree>
       <p:nvGrpSpPr>
         <p:cNvPr id="1" name=""/>
@@ -3463,26 +3478,9 @@
           <a:lstStyle/>
           <a:p>
             <a:r>
-              <a:rPr lang="fi-FI" dirty="0" err="1"/>
-              <a:t>Nutrient</a:t>
-            </a:r>
-            <a:r>
-              <a:rPr lang="fi-FI" dirty="0"/>
-              <a:t> </a:t>
-            </a:r>
-            <a:r>
-              <a:rPr lang="fi-FI" dirty="0" err="1"/>
-              <a:t>attachment</a:t>
-            </a:r>
-            <a:r>
-              <a:rPr lang="fi-FI" dirty="0"/>
-              <a:t> UI </a:t>
-            </a:r>
-            <a:r>
-              <a:rPr lang="fi-FI" dirty="0" err="1"/>
-              <a:t>creation</a:t>
-            </a:r>
-            <a:endParaRPr lang="fi-FI" dirty="0"/>
+              <a:rPr lang="en-GB"/>
+              <a:t>Nutrient attachment UI creation</a:t>
+            </a:r>
           </a:p>
         </p:txBody>
       </p:sp>
@@ -3504,10 +3502,97 @@
         </p:nvSpPr>
         <p:spPr/>
         <p:txBody>
-          <a:bodyPr/>
-          <a:lstStyle/>
-          <a:p>
-            <a:endParaRPr lang="fi-FI" dirty="0"/>
+          <a:bodyPr>
+            <a:normAutofit fontScale="77500" lnSpcReduction="20000"/>
+          </a:bodyPr>
+          <a:lstStyle/>
+          <a:p>
+            <a:pPr>
+              <a:lnSpc>
+                <a:spcPct val="100000"/>
+              </a:lnSpc>
+            </a:pPr>
+            <a:r>
+              <a:rPr lang="en-GB" dirty="0"/>
+              <a:t>There was no digital version of the service</a:t>
+            </a:r>
+          </a:p>
+          <a:p>
+            <a:pPr>
+              <a:lnSpc>
+                <a:spcPct val="100000"/>
+              </a:lnSpc>
+            </a:pPr>
+            <a:r>
+              <a:rPr lang="en-GB" dirty="0"/>
+              <a:t>The goal was to make one with AngularJS with a usable UX</a:t>
+            </a:r>
+          </a:p>
+          <a:p>
+            <a:pPr>
+              <a:lnSpc>
+                <a:spcPct val="100000"/>
+              </a:lnSpc>
+            </a:pPr>
+            <a:r>
+              <a:rPr lang="en-GB" dirty="0"/>
+              <a:t>First I went through all the current material: laws, user support websites, paper forms</a:t>
+            </a:r>
+          </a:p>
+          <a:p>
+            <a:pPr>
+              <a:lnSpc>
+                <a:spcPct val="100000"/>
+              </a:lnSpc>
+            </a:pPr>
+            <a:r>
+              <a:rPr lang="en-GB" dirty="0"/>
+              <a:t>Then I designed rough layouts for the website with pen and paper</a:t>
+            </a:r>
+          </a:p>
+          <a:p>
+            <a:pPr>
+              <a:lnSpc>
+                <a:spcPct val="100000"/>
+              </a:lnSpc>
+            </a:pPr>
+            <a:r>
+              <a:rPr lang="en-GB" dirty="0"/>
+              <a:t>Then I designed new wireframe layouts with Sketch based on the Design System components</a:t>
+            </a:r>
+          </a:p>
+          <a:p>
+            <a:pPr>
+              <a:lnSpc>
+                <a:spcPct val="100000"/>
+              </a:lnSpc>
+            </a:pPr>
+            <a:r>
+              <a:rPr lang="en-GB" dirty="0"/>
+              <a:t>The end result was Sketch layouts for the service and full UI description with pictures in Confluence</a:t>
+            </a:r>
+          </a:p>
+          <a:p>
+            <a:pPr>
+              <a:lnSpc>
+                <a:spcPct val="100000"/>
+              </a:lnSpc>
+            </a:pPr>
+            <a:r>
+              <a:rPr lang="en-GB" dirty="0"/>
+              <a:t>A particular problem was a selection of the right fertilizer from a list of c. 1500. We solved this with a lot of concepting and prototyping and quick usability testing</a:t>
+            </a:r>
+          </a:p>
+          <a:p>
+            <a:pPr>
+              <a:lnSpc>
+                <a:spcPct val="100000"/>
+              </a:lnSpc>
+            </a:pPr>
+            <a:r>
+              <a:rPr lang="en-GB" dirty="0"/>
+              <a:t>The work was done with a lot of collaboration with the customer, and design and dev teams. Also, there were many rounds of informal usability tests</a:t>
+            </a:r>
           </a:p>
         </p:txBody>
       </p:sp>

</xml_diff>